<commit_message>
small changes post-class to Week 8 lecture
</commit_message>
<xml_diff>
--- a/Week 8 -- Multivariate models/Lecture 8/Week 8 Lecture -- multivariate models.pptx
+++ b/Week 8 -- Multivariate models/Lecture 8/Week 8 Lecture -- multivariate models.pptx
@@ -215,7 +215,7 @@
           <a:p>
             <a:fld id="{1522831B-4FE3-4D45-950B-0D2C6BB2DD76}" type="datetimeFigureOut">
               <a:rPr lang="en-US" smtClean="0"/>
-              <a:t>5/11/2018</a:t>
+              <a:t>5/15/2018</a:t>
             </a:fld>
             <a:endParaRPr lang="en-US"/>
           </a:p>
@@ -5116,11 +5116,7 @@
           <a:p>
             <a:r>
               <a:rPr lang="en-US" dirty="0" smtClean="0"/>
-              <a:t>May 15, </a:t>
-            </a:r>
-            <a:r>
-              <a:rPr lang="en-US" dirty="0" smtClean="0"/>
-              <a:t>2018</a:t>
+              <a:t>May 15, 2018</a:t>
             </a:r>
           </a:p>
           <a:p>
@@ -7802,8 +7798,8 @@
           </a:p>
         </p:txBody>
       </p:sp>
-      <mc:AlternateContent xmlns:mc="http://schemas.openxmlformats.org/markup-compatibility/2006">
-        <mc:Choice xmlns:a14="http://schemas.microsoft.com/office/drawing/2010/main" Requires="a14">
+      <mc:AlternateContent xmlns:mc="http://schemas.openxmlformats.org/markup-compatibility/2006" xmlns:a14="http://schemas.microsoft.com/office/drawing/2010/main">
+        <mc:Choice Requires="a14">
           <p:sp>
             <p:nvSpPr>
               <p:cNvPr id="3" name="Content Placeholder 2"/>
@@ -8598,7 +8594,7 @@
             </p:txBody>
           </p:sp>
         </mc:Choice>
-        <mc:Fallback>
+        <mc:Fallback xmlns="">
           <p:sp>
             <p:nvSpPr>
               <p:cNvPr id="3" name="Content Placeholder 2"/>
@@ -8695,8 +8691,8 @@
           </a:p>
         </p:txBody>
       </p:sp>
-      <mc:AlternateContent xmlns:mc="http://schemas.openxmlformats.org/markup-compatibility/2006">
-        <mc:Choice xmlns:a14="http://schemas.microsoft.com/office/drawing/2010/main" Requires="a14">
+      <mc:AlternateContent xmlns:mc="http://schemas.openxmlformats.org/markup-compatibility/2006" xmlns:a14="http://schemas.microsoft.com/office/drawing/2010/main">
+        <mc:Choice Requires="a14">
           <p:sp>
             <p:nvSpPr>
               <p:cNvPr id="3" name="Content Placeholder 2"/>
@@ -8877,7 +8873,7 @@
             </p:txBody>
           </p:sp>
         </mc:Choice>
-        <mc:Fallback>
+        <mc:Fallback xmlns="">
           <p:sp>
             <p:nvSpPr>
               <p:cNvPr id="3" name="Content Placeholder 2"/>
@@ -9203,6 +9199,13 @@
   <p:clrMapOvr>
     <a:masterClrMapping/>
   </p:clrMapOvr>
+  <p:timing>
+    <p:tnLst>
+      <p:par>
+        <p:cTn id="1" dur="indefinite" restart="never" nodeType="tmRoot"/>
+      </p:par>
+    </p:tnLst>
+  </p:timing>
 </p:sld>
 </file>
 
@@ -9628,8 +9631,8 @@
           </a:p>
         </p:txBody>
       </p:sp>
-      <mc:AlternateContent xmlns:mc="http://schemas.openxmlformats.org/markup-compatibility/2006" xmlns:a14="http://schemas.microsoft.com/office/drawing/2010/main">
-        <mc:Choice Requires="a14">
+      <mc:AlternateContent xmlns:mc="http://schemas.openxmlformats.org/markup-compatibility/2006">
+        <mc:Choice xmlns:a14="http://schemas.microsoft.com/office/drawing/2010/main" Requires="a14">
           <p:sp>
             <p:nvSpPr>
               <p:cNvPr id="3" name="Content Placeholder 2"/>
@@ -9977,6 +9980,21 @@
                           </m:ctrlPr>
                         </m:dPr>
                         <m:e>
+                          <m:r>
+                            <m:rPr>
+                              <m:sty m:val="p"/>
+                            </m:rPr>
+                            <a:rPr lang="en-US" b="0" i="0" smtClean="0">
+                              <a:latin typeface="Cambria Math" panose="02040503050406030204" pitchFamily="18" charset="0"/>
+                            </a:rPr>
+                            <m:t>log</m:t>
+                          </m:r>
+                          <m:r>
+                            <a:rPr lang="en-US" b="0" i="1" smtClean="0">
+                              <a:latin typeface="Cambria Math" panose="02040503050406030204" pitchFamily="18" charset="0"/>
+                            </a:rPr>
+                            <m:t>⁡(</m:t>
+                          </m:r>
                           <m:sSub>
                             <m:sSubPr>
                               <m:ctrlPr>
@@ -10030,58 +10048,96 @@
                             <a:rPr lang="en-US" b="0" i="1" smtClean="0">
                               <a:latin typeface="Cambria Math" panose="02040503050406030204" pitchFamily="18" charset="0"/>
                             </a:rPr>
+                            <m:t>)</m:t>
+                          </m:r>
+                          <m:r>
+                            <a:rPr lang="en-US" b="0" i="1" smtClean="0">
+                              <a:latin typeface="Cambria Math" panose="02040503050406030204" pitchFamily="18" charset="0"/>
+                            </a:rPr>
                             <m:t>,</m:t>
                           </m:r>
-                          <m:sSub>
-                            <m:sSubPr>
+                          <m:func>
+                            <m:funcPr>
                               <m:ctrlPr>
-                                <a:rPr lang="en-US" i="1">
+                                <a:rPr lang="en-US" b="0" i="1" smtClean="0">
                                   <a:latin typeface="Cambria Math" panose="02040503050406030204" pitchFamily="18" charset="0"/>
                                 </a:rPr>
                               </m:ctrlPr>
-                            </m:sSubPr>
-                            <m:e>
+                            </m:funcPr>
+                            <m:fName>
                               <m:r>
-                                <a:rPr lang="en-US" i="1">
-                                  <a:latin typeface="Cambria Math"/>
-                                  <a:ea typeface="Cambria Math"/>
-                                </a:rPr>
-                                <m:t>𝜆</m:t>
-                              </m:r>
-                            </m:e>
-                            <m:sub>
-                              <m:r>
-                                <a:rPr lang="en-US" i="1">
+                                <m:rPr>
+                                  <m:sty m:val="p"/>
+                                </m:rPr>
+                                <a:rPr lang="en-US" b="0" i="0" smtClean="0">
                                   <a:latin typeface="Cambria Math" panose="02040503050406030204" pitchFamily="18" charset="0"/>
                                 </a:rPr>
-                                <m:t>𝑝</m:t>
+                                <m:t>log</m:t>
                               </m:r>
-                              <m:r>
-                                <a:rPr lang="en-US" b="0" i="1" smtClean="0">
-                                  <a:latin typeface="Cambria Math" panose="02040503050406030204" pitchFamily="18" charset="0"/>
-                                </a:rPr>
-                                <m:t>2</m:t>
-                              </m:r>
-                            </m:sub>
-                          </m:sSub>
-                          <m:r>
-                            <a:rPr lang="en-US" i="1">
-                              <a:latin typeface="Cambria Math" panose="02040503050406030204" pitchFamily="18" charset="0"/>
-                            </a:rPr>
-                            <m:t>(</m:t>
-                          </m:r>
-                          <m:r>
-                            <a:rPr lang="en-US" i="1">
-                              <a:latin typeface="Cambria Math" panose="02040503050406030204" pitchFamily="18" charset="0"/>
-                            </a:rPr>
-                            <m:t>𝑠</m:t>
-                          </m:r>
-                          <m:r>
-                            <a:rPr lang="en-US" i="1">
-                              <a:latin typeface="Cambria Math" panose="02040503050406030204" pitchFamily="18" charset="0"/>
-                            </a:rPr>
-                            <m:t>)</m:t>
-                          </m:r>
+                            </m:fName>
+                            <m:e>
+                              <m:d>
+                                <m:dPr>
+                                  <m:ctrlPr>
+                                    <a:rPr lang="en-US" b="0" i="1" smtClean="0">
+                                      <a:latin typeface="Cambria Math" panose="02040503050406030204" pitchFamily="18" charset="0"/>
+                                    </a:rPr>
+                                  </m:ctrlPr>
+                                </m:dPr>
+                                <m:e>
+                                  <m:sSub>
+                                    <m:sSubPr>
+                                      <m:ctrlPr>
+                                        <a:rPr lang="en-US" i="1">
+                                          <a:latin typeface="Cambria Math" panose="02040503050406030204" pitchFamily="18" charset="0"/>
+                                        </a:rPr>
+                                      </m:ctrlPr>
+                                    </m:sSubPr>
+                                    <m:e>
+                                      <m:r>
+                                        <a:rPr lang="en-US" i="1">
+                                          <a:latin typeface="Cambria Math"/>
+                                          <a:ea typeface="Cambria Math"/>
+                                        </a:rPr>
+                                        <m:t>𝜆</m:t>
+                                      </m:r>
+                                    </m:e>
+                                    <m:sub>
+                                      <m:r>
+                                        <a:rPr lang="en-US" i="1">
+                                          <a:latin typeface="Cambria Math" panose="02040503050406030204" pitchFamily="18" charset="0"/>
+                                        </a:rPr>
+                                        <m:t>𝑝</m:t>
+                                      </m:r>
+                                      <m:r>
+                                        <a:rPr lang="en-US" b="0" i="1" smtClean="0">
+                                          <a:latin typeface="Cambria Math" panose="02040503050406030204" pitchFamily="18" charset="0"/>
+                                        </a:rPr>
+                                        <m:t>2</m:t>
+                                      </m:r>
+                                    </m:sub>
+                                  </m:sSub>
+                                  <m:d>
+                                    <m:dPr>
+                                      <m:ctrlPr>
+                                        <a:rPr lang="en-US" b="0" i="1">
+                                          <a:latin typeface="Cambria Math" panose="02040503050406030204" pitchFamily="18" charset="0"/>
+                                        </a:rPr>
+                                      </m:ctrlPr>
+                                    </m:dPr>
+                                    <m:e>
+                                      <m:r>
+                                        <a:rPr lang="en-US" i="1">
+                                          <a:latin typeface="Cambria Math" panose="02040503050406030204" pitchFamily="18" charset="0"/>
+                                        </a:rPr>
+                                        <m:t>𝑠</m:t>
+                                      </m:r>
+                                    </m:e>
+                                  </m:d>
+                                </m:e>
+                              </m:d>
+                            </m:e>
+                          </m:func>
                         </m:e>
                       </m:d>
                       <m:r>
@@ -10340,7 +10396,7 @@
             </p:txBody>
           </p:sp>
         </mc:Choice>
-        <mc:Fallback xmlns="">
+        <mc:Fallback>
           <p:sp>
             <p:nvSpPr>
               <p:cNvPr id="3" name="Content Placeholder 2"/>

</xml_diff>

<commit_message>
added dummy slide for Week 8 lecture...
... to be added next time I teach ;)
</commit_message>
<xml_diff>
--- a/Week 8 -- Multivariate models/Lecture 8/Week 8 Lecture -- multivariate models.pptx
+++ b/Week 8 -- Multivariate models/Lecture 8/Week 8 Lecture -- multivariate models.pptx
@@ -5,7 +5,7 @@
     <p:sldMasterId id="2147483672" r:id="rId1"/>
   </p:sldMasterIdLst>
   <p:notesMasterIdLst>
-    <p:notesMasterId r:id="rId18"/>
+    <p:notesMasterId r:id="rId19"/>
   </p:notesMasterIdLst>
   <p:sldIdLst>
     <p:sldId id="266" r:id="rId2"/>
@@ -23,7 +23,8 @@
     <p:sldId id="279" r:id="rId14"/>
     <p:sldId id="282" r:id="rId15"/>
     <p:sldId id="281" r:id="rId16"/>
-    <p:sldId id="278" r:id="rId17"/>
+    <p:sldId id="283" r:id="rId17"/>
+    <p:sldId id="278" r:id="rId18"/>
   </p:sldIdLst>
   <p:sldSz cx="9144000" cy="6858000" type="screen4x3"/>
   <p:notesSz cx="6858000" cy="9144000"/>
@@ -952,6 +953,95 @@
     <p:extLst>
       <p:ext uri="{BB962C8B-B14F-4D97-AF65-F5344CB8AC3E}">
         <p14:creationId xmlns:p14="http://schemas.microsoft.com/office/powerpoint/2010/main" val="3709595020"/>
+      </p:ext>
+    </p:extLst>
+  </p:cSld>
+  <p:clrMapOvr>
+    <a:masterClrMapping/>
+  </p:clrMapOvr>
+</p:notes>
+</file>
+
+<file path=ppt/notesSlides/notesSlide14.xml><?xml version="1.0" encoding="utf-8"?>
+<p:notes xmlns:a="http://schemas.openxmlformats.org/drawingml/2006/main" xmlns:r="http://schemas.openxmlformats.org/officeDocument/2006/relationships" xmlns:p="http://schemas.openxmlformats.org/presentationml/2006/main">
+  <p:cSld>
+    <p:spTree>
+      <p:nvGrpSpPr>
+        <p:cNvPr id="1" name=""/>
+        <p:cNvGrpSpPr/>
+        <p:nvPr/>
+      </p:nvGrpSpPr>
+      <p:grpSpPr>
+        <a:xfrm>
+          <a:off x="0" y="0"/>
+          <a:ext cx="0" cy="0"/>
+          <a:chOff x="0" y="0"/>
+          <a:chExt cx="0" cy="0"/>
+        </a:xfrm>
+      </p:grpSpPr>
+      <p:sp>
+        <p:nvSpPr>
+          <p:cNvPr id="2" name="Slide Image Placeholder 1"/>
+          <p:cNvSpPr>
+            <a:spLocks noGrp="1" noRot="1" noChangeAspect="1"/>
+          </p:cNvSpPr>
+          <p:nvPr>
+            <p:ph type="sldImg"/>
+          </p:nvPr>
+        </p:nvSpPr>
+        <p:spPr/>
+      </p:sp>
+      <p:sp>
+        <p:nvSpPr>
+          <p:cNvPr id="3" name="Notes Placeholder 2"/>
+          <p:cNvSpPr>
+            <a:spLocks noGrp="1"/>
+          </p:cNvSpPr>
+          <p:nvPr>
+            <p:ph type="body" idx="1"/>
+          </p:nvPr>
+        </p:nvSpPr>
+        <p:spPr/>
+        <p:txBody>
+          <a:bodyPr/>
+          <a:lstStyle/>
+          <a:p>
+            <a:r>
+              <a:rPr lang="en-US" dirty="0" smtClean="0"/>
+              <a:t>Animate in the math</a:t>
+            </a:r>
+            <a:endParaRPr lang="en-US" dirty="0"/>
+          </a:p>
+        </p:txBody>
+      </p:sp>
+      <p:sp>
+        <p:nvSpPr>
+          <p:cNvPr id="4" name="Slide Number Placeholder 3"/>
+          <p:cNvSpPr>
+            <a:spLocks noGrp="1"/>
+          </p:cNvSpPr>
+          <p:nvPr>
+            <p:ph type="sldNum" sz="quarter" idx="10"/>
+          </p:nvPr>
+        </p:nvSpPr>
+        <p:spPr/>
+        <p:txBody>
+          <a:bodyPr/>
+          <a:lstStyle/>
+          <a:p>
+            <a:fld id="{66BC1E2D-6915-48DE-882D-0DD49F79802C}" type="slidenum">
+              <a:rPr lang="en-US" smtClean="0"/>
+              <a:pPr/>
+              <a:t>16</a:t>
+            </a:fld>
+            <a:endParaRPr lang="en-US"/>
+          </a:p>
+        </p:txBody>
+      </p:sp>
+    </p:spTree>
+    <p:extLst>
+      <p:ext uri="{BB962C8B-B14F-4D97-AF65-F5344CB8AC3E}">
+        <p14:creationId xmlns:p14="http://schemas.microsoft.com/office/powerpoint/2010/main" val="2102241286"/>
       </p:ext>
     </p:extLst>
   </p:cSld>
@@ -8967,6 +9057,148 @@
               <a:rPr lang="en-US" dirty="0"/>
               <a:t>Community distribution models</a:t>
             </a:r>
+          </a:p>
+        </p:txBody>
+      </p:sp>
+      <p:sp>
+        <p:nvSpPr>
+          <p:cNvPr id="3" name="Content Placeholder 2"/>
+          <p:cNvSpPr>
+            <a:spLocks noGrp="1"/>
+          </p:cNvSpPr>
+          <p:nvPr>
+            <p:ph idx="1"/>
+          </p:nvPr>
+        </p:nvSpPr>
+        <p:spPr>
+          <a:xfrm>
+            <a:off x="76199" y="1066800"/>
+            <a:ext cx="8765875" cy="5562600"/>
+          </a:xfrm>
+        </p:spPr>
+        <p:txBody>
+          <a:bodyPr>
+            <a:noAutofit/>
+          </a:bodyPr>
+          <a:lstStyle/>
+          <a:p>
+            <a:pPr marL="0" indent="0">
+              <a:buNone/>
+            </a:pPr>
+            <a:r>
+              <a:rPr lang="en-US" b="1" dirty="0" smtClean="0"/>
+              <a:t>Interpretation </a:t>
+            </a:r>
+            <a:r>
+              <a:rPr lang="en-US" b="1" smtClean="0"/>
+              <a:t>of covariance </a:t>
+            </a:r>
+            <a:r>
+              <a:rPr lang="en-US" b="1" dirty="0" smtClean="0"/>
+              <a:t>matrix</a:t>
+            </a:r>
+            <a:endParaRPr lang="en-US" b="1" dirty="0"/>
+          </a:p>
+          <a:p>
+            <a:pPr marL="457200" indent="-457200">
+              <a:buFont typeface="+mj-lt"/>
+              <a:buAutoNum type="arabicPeriod"/>
+            </a:pPr>
+            <a:r>
+              <a:rPr lang="en-US" dirty="0" smtClean="0"/>
+              <a:t>Associations</a:t>
+            </a:r>
+            <a:endParaRPr lang="en-US" dirty="0" smtClean="0"/>
+          </a:p>
+          <a:p>
+            <a:pPr marL="685800" lvl="1"/>
+            <a:endParaRPr lang="en-US" sz="1800" dirty="0" smtClean="0"/>
+          </a:p>
+          <a:p>
+            <a:pPr marL="400050" indent="-457200">
+              <a:buFont typeface="+mj-lt"/>
+              <a:buAutoNum type="arabicPeriod"/>
+            </a:pPr>
+            <a:r>
+              <a:rPr lang="en-US" sz="2400" dirty="0" smtClean="0"/>
+              <a:t>Major axis regression</a:t>
+            </a:r>
+          </a:p>
+          <a:p>
+            <a:pPr marL="400050" indent="-457200">
+              <a:buFont typeface="+mj-lt"/>
+              <a:buAutoNum type="arabicPeriod"/>
+            </a:pPr>
+            <a:endParaRPr lang="en-US" sz="2400" dirty="0"/>
+          </a:p>
+          <a:p>
+            <a:pPr marL="400050" indent="-457200">
+              <a:buFont typeface="+mj-lt"/>
+              <a:buAutoNum type="arabicPeriod"/>
+            </a:pPr>
+            <a:r>
+              <a:rPr lang="en-US" sz="2400" dirty="0" smtClean="0"/>
+              <a:t>Linear regression</a:t>
+            </a:r>
+          </a:p>
+        </p:txBody>
+      </p:sp>
+    </p:spTree>
+    <p:extLst>
+      <p:ext uri="{BB962C8B-B14F-4D97-AF65-F5344CB8AC3E}">
+        <p14:creationId xmlns:p14="http://schemas.microsoft.com/office/powerpoint/2010/main" val="2074793112"/>
+      </p:ext>
+    </p:extLst>
+  </p:cSld>
+  <p:clrMapOvr>
+    <a:masterClrMapping/>
+  </p:clrMapOvr>
+  <p:timing>
+    <p:tnLst>
+      <p:par>
+        <p:cTn id="1" dur="indefinite" restart="never" nodeType="tmRoot"/>
+      </p:par>
+    </p:tnLst>
+  </p:timing>
+</p:sld>
+</file>
+
+<file path=ppt/slides/slide17.xml><?xml version="1.0" encoding="utf-8"?>
+<p:sld xmlns:a="http://schemas.openxmlformats.org/drawingml/2006/main" xmlns:r="http://schemas.openxmlformats.org/officeDocument/2006/relationships" xmlns:p="http://schemas.openxmlformats.org/presentationml/2006/main">
+  <p:cSld>
+    <p:spTree>
+      <p:nvGrpSpPr>
+        <p:cNvPr id="1" name=""/>
+        <p:cNvGrpSpPr/>
+        <p:nvPr/>
+      </p:nvGrpSpPr>
+      <p:grpSpPr>
+        <a:xfrm>
+          <a:off x="0" y="0"/>
+          <a:ext cx="0" cy="0"/>
+          <a:chOff x="0" y="0"/>
+          <a:chExt cx="0" cy="0"/>
+        </a:xfrm>
+      </p:grpSpPr>
+      <p:sp>
+        <p:nvSpPr>
+          <p:cNvPr id="2" name="Title 1"/>
+          <p:cNvSpPr>
+            <a:spLocks noGrp="1"/>
+          </p:cNvSpPr>
+          <p:nvPr>
+            <p:ph type="title"/>
+          </p:nvPr>
+        </p:nvSpPr>
+        <p:spPr/>
+        <p:txBody>
+          <a:bodyPr/>
+          <a:lstStyle/>
+          <a:p>
+            <a:r>
+              <a:rPr lang="en-US" dirty="0"/>
+              <a:t>Community distribution models</a:t>
+            </a:r>
             <a:endParaRPr lang="en-GB" dirty="0"/>
           </a:p>
         </p:txBody>
@@ -9631,8 +9863,8 @@
           </a:p>
         </p:txBody>
       </p:sp>
-      <mc:AlternateContent xmlns:mc="http://schemas.openxmlformats.org/markup-compatibility/2006">
-        <mc:Choice xmlns:a14="http://schemas.microsoft.com/office/drawing/2010/main" Requires="a14">
+      <mc:AlternateContent xmlns:mc="http://schemas.openxmlformats.org/markup-compatibility/2006" xmlns:a14="http://schemas.microsoft.com/office/drawing/2010/main">
+        <mc:Choice Requires="a14">
           <p:sp>
             <p:nvSpPr>
               <p:cNvPr id="3" name="Content Placeholder 2"/>
@@ -10048,13 +10280,7 @@
                             <a:rPr lang="en-US" b="0" i="1" smtClean="0">
                               <a:latin typeface="Cambria Math" panose="02040503050406030204" pitchFamily="18" charset="0"/>
                             </a:rPr>
-                            <m:t>)</m:t>
-                          </m:r>
-                          <m:r>
-                            <a:rPr lang="en-US" b="0" i="1" smtClean="0">
-                              <a:latin typeface="Cambria Math" panose="02040503050406030204" pitchFamily="18" charset="0"/>
-                            </a:rPr>
-                            <m:t>,</m:t>
+                            <m:t>),</m:t>
                           </m:r>
                           <m:func>
                             <m:funcPr>
@@ -10396,7 +10622,7 @@
             </p:txBody>
           </p:sp>
         </mc:Choice>
-        <mc:Fallback>
+        <mc:Fallback xmlns="">
           <p:sp>
             <p:nvSpPr>
               <p:cNvPr id="3" name="Content Placeholder 2"/>

</xml_diff>